<commit_message>
removed sensitive information from code
</commit_message>
<xml_diff>
--- a/Project_0_PowerPoint.pptx
+++ b/Project_0_PowerPoint.pptx
@@ -7,6 +7,7 @@
   <p:sldIdLst>
     <p:sldId id="256" r:id="rId2"/>
     <p:sldId id="257" r:id="rId3"/>
+    <p:sldId id="258" r:id="rId4"/>
   </p:sldIdLst>
   <p:sldSz cx="12192000" cy="6858000"/>
   <p:notesSz cx="6858000" cy="9144000"/>
@@ -105,6 +106,11 @@
       </a:defRPr>
     </a:lvl9pPr>
   </p:defaultTextStyle>
+  <p:extLst>
+    <p:ext uri="{EFAFB233-063F-42B5-8137-9DF3F51BA10A}">
+      <p15:sldGuideLst xmlns:p15="http://schemas.microsoft.com/office/powerpoint/2012/main"/>
+    </p:ext>
+  </p:extLst>
 </p:presentation>
 </file>
 
@@ -255,7 +261,7 @@
           <a:p>
             <a:fld id="{E62D9B50-5415-4A46-B118-BAD9B6D9BC29}" type="datetimeFigureOut">
               <a:rPr lang="en-US" smtClean="0"/>
-              <a:t>1/9/2022</a:t>
+              <a:t>1/11/2022</a:t>
             </a:fld>
             <a:endParaRPr lang="en-US"/>
           </a:p>
@@ -453,7 +459,7 @@
           <a:p>
             <a:fld id="{E62D9B50-5415-4A46-B118-BAD9B6D9BC29}" type="datetimeFigureOut">
               <a:rPr lang="en-US" smtClean="0"/>
-              <a:t>1/9/2022</a:t>
+              <a:t>1/11/2022</a:t>
             </a:fld>
             <a:endParaRPr lang="en-US"/>
           </a:p>
@@ -661,7 +667,7 @@
           <a:p>
             <a:fld id="{E62D9B50-5415-4A46-B118-BAD9B6D9BC29}" type="datetimeFigureOut">
               <a:rPr lang="en-US" smtClean="0"/>
-              <a:t>1/9/2022</a:t>
+              <a:t>1/11/2022</a:t>
             </a:fld>
             <a:endParaRPr lang="en-US"/>
           </a:p>
@@ -859,7 +865,7 @@
           <a:p>
             <a:fld id="{E62D9B50-5415-4A46-B118-BAD9B6D9BC29}" type="datetimeFigureOut">
               <a:rPr lang="en-US" smtClean="0"/>
-              <a:t>1/9/2022</a:t>
+              <a:t>1/11/2022</a:t>
             </a:fld>
             <a:endParaRPr lang="en-US"/>
           </a:p>
@@ -1134,7 +1140,7 @@
           <a:p>
             <a:fld id="{E62D9B50-5415-4A46-B118-BAD9B6D9BC29}" type="datetimeFigureOut">
               <a:rPr lang="en-US" smtClean="0"/>
-              <a:t>1/9/2022</a:t>
+              <a:t>1/11/2022</a:t>
             </a:fld>
             <a:endParaRPr lang="en-US"/>
           </a:p>
@@ -1399,7 +1405,7 @@
           <a:p>
             <a:fld id="{E62D9B50-5415-4A46-B118-BAD9B6D9BC29}" type="datetimeFigureOut">
               <a:rPr lang="en-US" smtClean="0"/>
-              <a:t>1/9/2022</a:t>
+              <a:t>1/11/2022</a:t>
             </a:fld>
             <a:endParaRPr lang="en-US"/>
           </a:p>
@@ -1811,7 +1817,7 @@
           <a:p>
             <a:fld id="{E62D9B50-5415-4A46-B118-BAD9B6D9BC29}" type="datetimeFigureOut">
               <a:rPr lang="en-US" smtClean="0"/>
-              <a:t>1/9/2022</a:t>
+              <a:t>1/11/2022</a:t>
             </a:fld>
             <a:endParaRPr lang="en-US"/>
           </a:p>
@@ -1952,7 +1958,7 @@
           <a:p>
             <a:fld id="{E62D9B50-5415-4A46-B118-BAD9B6D9BC29}" type="datetimeFigureOut">
               <a:rPr lang="en-US" smtClean="0"/>
-              <a:t>1/9/2022</a:t>
+              <a:t>1/11/2022</a:t>
             </a:fld>
             <a:endParaRPr lang="en-US"/>
           </a:p>
@@ -2065,7 +2071,7 @@
           <a:p>
             <a:fld id="{E62D9B50-5415-4A46-B118-BAD9B6D9BC29}" type="datetimeFigureOut">
               <a:rPr lang="en-US" smtClean="0"/>
-              <a:t>1/9/2022</a:t>
+              <a:t>1/11/2022</a:t>
             </a:fld>
             <a:endParaRPr lang="en-US"/>
           </a:p>
@@ -2376,7 +2382,7 @@
           <a:p>
             <a:fld id="{E62D9B50-5415-4A46-B118-BAD9B6D9BC29}" type="datetimeFigureOut">
               <a:rPr lang="en-US" smtClean="0"/>
-              <a:t>1/9/2022</a:t>
+              <a:t>1/11/2022</a:t>
             </a:fld>
             <a:endParaRPr lang="en-US"/>
           </a:p>
@@ -2664,7 +2670,7 @@
           <a:p>
             <a:fld id="{E62D9B50-5415-4A46-B118-BAD9B6D9BC29}" type="datetimeFigureOut">
               <a:rPr lang="en-US" smtClean="0"/>
-              <a:t>1/9/2022</a:t>
+              <a:t>1/11/2022</a:t>
             </a:fld>
             <a:endParaRPr lang="en-US"/>
           </a:p>
@@ -2905,7 +2911,7 @@
           <a:p>
             <a:fld id="{E62D9B50-5415-4A46-B118-BAD9B6D9BC29}" type="datetimeFigureOut">
               <a:rPr lang="en-US" smtClean="0"/>
-              <a:t>1/9/2022</a:t>
+              <a:t>1/11/2022</a:t>
             </a:fld>
             <a:endParaRPr lang="en-US"/>
           </a:p>
@@ -3366,7 +3372,7 @@
         </p:nvSpPr>
         <p:spPr>
           <a:xfrm>
-            <a:off x="1354029" y="219645"/>
+            <a:off x="1327396" y="1151800"/>
             <a:ext cx="9144000" cy="2387600"/>
           </a:xfrm>
         </p:spPr>
@@ -3387,11 +3393,141 @@
                 <a:latin typeface="Castellar" panose="020A0402060406010301" pitchFamily="18" charset="0"/>
               </a:rPr>
             </a:br>
+            <a:endParaRPr lang="en-US" dirty="0">
+              <a:latin typeface="Castellar" panose="020A0402060406010301" pitchFamily="18" charset="0"/>
+            </a:endParaRPr>
+          </a:p>
+        </p:txBody>
+      </p:sp>
+      <p:sp>
+        <p:nvSpPr>
+          <p:cNvPr id="3" name="Subtitle 2">
+            <a:extLst>
+              <a:ext uri="{FF2B5EF4-FFF2-40B4-BE49-F238E27FC236}">
+                <a16:creationId xmlns:a16="http://schemas.microsoft.com/office/drawing/2014/main" id="{D97917CB-191D-44C4-B838-88A98721CAC3}"/>
+              </a:ext>
+            </a:extLst>
+          </p:cNvPr>
+          <p:cNvSpPr>
+            <a:spLocks noGrp="1"/>
+          </p:cNvSpPr>
+          <p:nvPr>
+            <p:ph type="subTitle" idx="1"/>
+          </p:nvPr>
+        </p:nvSpPr>
+        <p:spPr>
+          <a:xfrm>
+            <a:off x="3577701" y="3814608"/>
+            <a:ext cx="4438836" cy="1008757"/>
+          </a:xfrm>
+        </p:spPr>
+        <p:txBody>
+          <a:bodyPr>
+            <a:normAutofit/>
+          </a:bodyPr>
+          <a:lstStyle/>
+          <a:p>
+            <a:r>
+              <a:rPr lang="en-US" dirty="0"/>
+              <a:t>By</a:t>
+            </a:r>
+          </a:p>
+          <a:p>
+            <a:r>
+              <a:rPr lang="en-US" dirty="0"/>
+              <a:t>Selena Fears</a:t>
+            </a:r>
+          </a:p>
+        </p:txBody>
+      </p:sp>
+    </p:spTree>
+    <p:extLst>
+      <p:ext uri="{BB962C8B-B14F-4D97-AF65-F5344CB8AC3E}">
+        <p14:creationId xmlns:p14="http://schemas.microsoft.com/office/powerpoint/2010/main" val="8046826"/>
+      </p:ext>
+    </p:extLst>
+  </p:cSld>
+  <p:clrMapOvr>
+    <a:masterClrMapping/>
+  </p:clrMapOvr>
+</p:sld>
+</file>
+
+<file path=ppt/slides/slide2.xml><?xml version="1.0" encoding="utf-8"?>
+<p:sld xmlns:a="http://schemas.openxmlformats.org/drawingml/2006/main" xmlns:r="http://schemas.openxmlformats.org/officeDocument/2006/relationships" xmlns:p="http://schemas.openxmlformats.org/presentationml/2006/main">
+  <p:cSld>
+    <p:bg>
+      <p:bgPr>
+        <a:gradFill>
+          <a:gsLst>
+            <a:gs pos="0">
+              <a:srgbClr val="0070C0"/>
+            </a:gs>
+            <a:gs pos="48000">
+              <a:schemeClr val="accent1">
+                <a:lumMod val="97000"/>
+                <a:lumOff val="3000"/>
+              </a:schemeClr>
+            </a:gs>
+            <a:gs pos="100000">
+              <a:schemeClr val="accent1">
+                <a:lumMod val="60000"/>
+                <a:lumOff val="40000"/>
+              </a:schemeClr>
+            </a:gs>
+          </a:gsLst>
+          <a:lin ang="16200000" scaled="1"/>
+        </a:gradFill>
+        <a:effectLst/>
+      </p:bgPr>
+    </p:bg>
+    <p:spTree>
+      <p:nvGrpSpPr>
+        <p:cNvPr id="1" name=""/>
+        <p:cNvGrpSpPr/>
+        <p:nvPr/>
+      </p:nvGrpSpPr>
+      <p:grpSpPr>
+        <a:xfrm>
+          <a:off x="0" y="0"/>
+          <a:ext cx="0" cy="0"/>
+          <a:chOff x="0" y="0"/>
+          <a:chExt cx="0" cy="0"/>
+        </a:xfrm>
+      </p:grpSpPr>
+      <p:sp>
+        <p:nvSpPr>
+          <p:cNvPr id="2" name="Title 1">
+            <a:extLst>
+              <a:ext uri="{FF2B5EF4-FFF2-40B4-BE49-F238E27FC236}">
+                <a16:creationId xmlns:a16="http://schemas.microsoft.com/office/drawing/2014/main" id="{A9370DE3-FCC5-496B-B76C-52BCCBC38A50}"/>
+              </a:ext>
+            </a:extLst>
+          </p:cNvPr>
+          <p:cNvSpPr>
+            <a:spLocks noGrp="1"/>
+          </p:cNvSpPr>
+          <p:nvPr>
+            <p:ph type="ctrTitle"/>
+          </p:nvPr>
+        </p:nvSpPr>
+        <p:spPr>
+          <a:xfrm>
+            <a:off x="2193636" y="953510"/>
+            <a:ext cx="7804727" cy="1163927"/>
+          </a:xfrm>
+        </p:spPr>
+        <p:txBody>
+          <a:bodyPr>
+            <a:normAutofit/>
+          </a:bodyPr>
+          <a:lstStyle/>
+          <a:p>
             <a:r>
               <a:rPr lang="en-US" dirty="0">
                 <a:latin typeface="Castellar" panose="020A0402060406010301" pitchFamily="18" charset="0"/>
               </a:rPr>
-              <a:t>A Scala Game</a:t>
+              <a:t>A  Scala Game</a:t>
             </a:r>
           </a:p>
         </p:txBody>
@@ -3401,7 +3537,7 @@
           <p:cNvPr id="3" name="Subtitle 2">
             <a:extLst>
               <a:ext uri="{FF2B5EF4-FFF2-40B4-BE49-F238E27FC236}">
-                <a16:creationId xmlns:a16="http://schemas.microsoft.com/office/drawing/2014/main" id="{D97917CB-191D-44C4-B838-88A98721CAC3}"/>
+                <a16:creationId xmlns:a16="http://schemas.microsoft.com/office/drawing/2014/main" id="{505FBC06-B531-4886-BB26-481D7473C30A}"/>
               </a:ext>
             </a:extLst>
           </p:cNvPr>
@@ -3414,14 +3550,12 @@
         </p:nvSpPr>
         <p:spPr>
           <a:xfrm>
-            <a:off x="1441142" y="2586307"/>
-            <a:ext cx="9309716" cy="2053037"/>
+            <a:off x="3412478" y="2283964"/>
+            <a:ext cx="4711262" cy="2055068"/>
           </a:xfrm>
         </p:spPr>
         <p:txBody>
-          <a:bodyPr>
-            <a:normAutofit/>
-          </a:bodyPr>
+          <a:bodyPr/>
           <a:lstStyle/>
           <a:p>
             <a:r>
@@ -3451,10 +3585,10 @@
       </p:sp>
       <p:pic>
         <p:nvPicPr>
-          <p:cNvPr id="5" name="Picture 4" descr="A picture containing silhouette&#10;&#10;Description automatically generated">
-            <a:extLst>
-              <a:ext uri="{FF2B5EF4-FFF2-40B4-BE49-F238E27FC236}">
-                <a16:creationId xmlns:a16="http://schemas.microsoft.com/office/drawing/2014/main" id="{0619C530-9FE2-45CF-9E8F-E24268555F67}"/>
+          <p:cNvPr id="4" name="Picture 3">
+            <a:extLst>
+              <a:ext uri="{FF2B5EF4-FFF2-40B4-BE49-F238E27FC236}">
+                <a16:creationId xmlns:a16="http://schemas.microsoft.com/office/drawing/2014/main" id="{ED307F02-0525-4265-B86E-CF68549AE92A}"/>
               </a:ext>
             </a:extLst>
           </p:cNvPr>
@@ -3465,47 +3599,11 @@
         </p:nvPicPr>
         <p:blipFill>
           <a:blip r:embed="rId2">
-            <a:extLst>
-              <a:ext uri="{28A0092B-C50C-407E-A947-70E740481C1C}">
-                <a14:useLocalDpi xmlns:a14="http://schemas.microsoft.com/office/drawing/2010/main" val="0"/>
-              </a:ext>
-            </a:extLst>
-          </a:blip>
-          <a:stretch>
-            <a:fillRect/>
-          </a:stretch>
-        </p:blipFill>
-        <p:spPr>
-          <a:xfrm>
-            <a:off x="9391651" y="187006"/>
-            <a:ext cx="2800350" cy="2800350"/>
-          </a:xfrm>
-          <a:prstGeom prst="rect">
-            <a:avLst/>
-          </a:prstGeom>
-        </p:spPr>
-      </p:pic>
-      <p:pic>
-        <p:nvPicPr>
-          <p:cNvPr id="15" name="Picture 14">
-            <a:extLst>
-              <a:ext uri="{FF2B5EF4-FFF2-40B4-BE49-F238E27FC236}">
-                <a16:creationId xmlns:a16="http://schemas.microsoft.com/office/drawing/2014/main" id="{9757FA26-D471-4633-B920-4C33EBC14233}"/>
-              </a:ext>
-            </a:extLst>
-          </p:cNvPr>
-          <p:cNvPicPr>
-            <a:picLocks noChangeAspect="1"/>
-          </p:cNvPicPr>
-          <p:nvPr/>
-        </p:nvPicPr>
-        <p:blipFill>
-          <a:blip r:embed="rId3">
             <a:alphaModFix/>
             <a:extLst>
               <a:ext uri="{BEBA8EAE-BF5A-486C-A8C5-ECC9F3942E4B}">
                 <a14:imgProps xmlns:a14="http://schemas.microsoft.com/office/drawing/2010/main">
-                  <a14:imgLayer r:embed="rId4">
+                  <a14:imgLayer r:embed="rId3">
                     <a14:imgEffect>
                       <a14:backgroundRemoval t="8496" b="89912" l="10000" r="90000">
                         <a14:foregroundMark x1="33214" y1="8496" x2="33214" y2="8496"/>
@@ -3527,7 +3625,7 @@
         </p:blipFill>
         <p:spPr>
           <a:xfrm>
-            <a:off x="-751992" y="358057"/>
+            <a:off x="-798572" y="135298"/>
             <a:ext cx="4299155" cy="2891825"/>
           </a:xfrm>
           <a:prstGeom prst="rect">
@@ -3537,10 +3635,10 @@
       </p:pic>
       <p:pic>
         <p:nvPicPr>
-          <p:cNvPr id="16" name="Picture 15" descr="A picture containing vector graphics&#10;&#10;Description automatically generated">
-            <a:extLst>
-              <a:ext uri="{FF2B5EF4-FFF2-40B4-BE49-F238E27FC236}">
-                <a16:creationId xmlns:a16="http://schemas.microsoft.com/office/drawing/2014/main" id="{15882D11-08FA-4DE0-B087-0164FA408BA8}"/>
+          <p:cNvPr id="5" name="Picture 4" descr="A picture containing vector graphics&#10;&#10;Description automatically generated">
+            <a:extLst>
+              <a:ext uri="{FF2B5EF4-FFF2-40B4-BE49-F238E27FC236}">
+                <a16:creationId xmlns:a16="http://schemas.microsoft.com/office/drawing/2014/main" id="{9059A39A-5249-4EAA-818B-EC9B82022452}"/>
               </a:ext>
             </a:extLst>
           </p:cNvPr>
@@ -3550,11 +3648,11 @@
           <p:nvPr/>
         </p:nvPicPr>
         <p:blipFill>
-          <a:blip r:embed="rId5">
+          <a:blip r:embed="rId4">
             <a:extLst>
               <a:ext uri="{BEBA8EAE-BF5A-486C-A8C5-ECC9F3942E4B}">
                 <a14:imgProps xmlns:a14="http://schemas.microsoft.com/office/drawing/2010/main">
-                  <a14:imgLayer r:embed="rId6">
+                  <a14:imgLayer r:embed="rId5">
                     <a14:imgEffect>
                       <a14:backgroundRemoval t="1381" b="98757" l="9753" r="89973">
                         <a14:foregroundMark x1="14973" y1="16160" x2="14973" y2="16160"/>
@@ -3633,8 +3731,44 @@
         </p:blipFill>
         <p:spPr>
           <a:xfrm>
-            <a:off x="5343524" y="4631854"/>
+            <a:off x="4696547" y="4578588"/>
             <a:ext cx="2143125" cy="2131448"/>
+          </a:xfrm>
+          <a:prstGeom prst="rect">
+            <a:avLst/>
+          </a:prstGeom>
+        </p:spPr>
+      </p:pic>
+      <p:pic>
+        <p:nvPicPr>
+          <p:cNvPr id="6" name="Picture 5" descr="A picture containing silhouette&#10;&#10;Description automatically generated">
+            <a:extLst>
+              <a:ext uri="{FF2B5EF4-FFF2-40B4-BE49-F238E27FC236}">
+                <a16:creationId xmlns:a16="http://schemas.microsoft.com/office/drawing/2014/main" id="{FC4183D9-DF2A-4D8B-B8E1-9612170ABDBF}"/>
+              </a:ext>
+            </a:extLst>
+          </p:cNvPr>
+          <p:cNvPicPr>
+            <a:picLocks noChangeAspect="1"/>
+          </p:cNvPicPr>
+          <p:nvPr/>
+        </p:nvPicPr>
+        <p:blipFill>
+          <a:blip r:embed="rId6">
+            <a:extLst>
+              <a:ext uri="{28A0092B-C50C-407E-A947-70E740481C1C}">
+                <a14:useLocalDpi xmlns:a14="http://schemas.microsoft.com/office/drawing/2010/main" val="0"/>
+              </a:ext>
+            </a:extLst>
+          </a:blip>
+          <a:stretch>
+            <a:fillRect/>
+          </a:stretch>
+        </p:blipFill>
+        <p:spPr>
+          <a:xfrm>
+            <a:off x="9342584" y="135298"/>
+            <a:ext cx="2800350" cy="2800350"/>
           </a:xfrm>
           <a:prstGeom prst="rect">
             <a:avLst/>
@@ -3644,7 +3778,7 @@
     </p:spTree>
     <p:extLst>
       <p:ext uri="{BB962C8B-B14F-4D97-AF65-F5344CB8AC3E}">
-        <p14:creationId xmlns:p14="http://schemas.microsoft.com/office/powerpoint/2010/main" val="8046826"/>
+        <p14:creationId xmlns:p14="http://schemas.microsoft.com/office/powerpoint/2010/main" val="2172918575"/>
       </p:ext>
     </p:extLst>
   </p:cSld>
@@ -3654,7 +3788,7 @@
 </p:sld>
 </file>
 
-<file path=ppt/slides/slide2.xml><?xml version="1.0" encoding="utf-8"?>
+<file path=ppt/slides/slide3.xml><?xml version="1.0" encoding="utf-8"?>
 <p:sld xmlns:a="http://schemas.openxmlformats.org/drawingml/2006/main" xmlns:r="http://schemas.openxmlformats.org/officeDocument/2006/relationships" xmlns:p="http://schemas.openxmlformats.org/presentationml/2006/main">
   <p:cSld>
     <p:bg>
@@ -3751,41 +3885,37 @@
         </p:nvSpPr>
         <p:spPr>
           <a:xfrm>
-            <a:off x="3500583" y="2117437"/>
-            <a:ext cx="4535054" cy="2623126"/>
+            <a:off x="447554" y="2472544"/>
+            <a:ext cx="10990384" cy="2623126"/>
           </a:xfrm>
         </p:spPr>
         <p:txBody>
-          <a:bodyPr/>
+          <a:bodyPr>
+            <a:normAutofit/>
+          </a:bodyPr>
           <a:lstStyle/>
           <a:p>
             <a:r>
               <a:rPr lang="en-US" dirty="0"/>
-              <a:t>Scala v- 2.11.12</a:t>
+              <a:t>Scala  2.11.12</a:t>
             </a:r>
           </a:p>
           <a:p>
             <a:r>
               <a:rPr lang="en-US" dirty="0"/>
-              <a:t>MySQL </a:t>
+              <a:t>SQL  8.0.19</a:t>
             </a:r>
           </a:p>
           <a:p>
             <a:r>
               <a:rPr lang="en-US" dirty="0"/>
-              <a:t>SBT</a:t>
+              <a:t>SBT 1.5.4</a:t>
             </a:r>
           </a:p>
           <a:p>
             <a:r>
               <a:rPr lang="en-US" dirty="0"/>
-              <a:t>Git</a:t>
-            </a:r>
-          </a:p>
-          <a:p>
-            <a:r>
-              <a:rPr lang="en-US" dirty="0"/>
-              <a:t>GitHub</a:t>
+              <a:t>GitHub (https://github.com/ProgrammingWithCybineer/Project_0_Scala_Game)</a:t>
             </a:r>
           </a:p>
           <a:p>
@@ -3796,7 +3926,7 @@
     </p:spTree>
     <p:extLst>
       <p:ext uri="{BB962C8B-B14F-4D97-AF65-F5344CB8AC3E}">
-        <p14:creationId xmlns:p14="http://schemas.microsoft.com/office/powerpoint/2010/main" val="2172918575"/>
+        <p14:creationId xmlns:p14="http://schemas.microsoft.com/office/powerpoint/2010/main" val="1472143582"/>
       </p:ext>
     </p:extLst>
   </p:cSld>

</xml_diff>